<commit_message>
midstep - minor edits to functions and starting to share updates from the nbs community report to this report
</commit_message>
<xml_diff>
--- a/code/styles_reference.pptx
+++ b/code/styles_reference.pptx
@@ -113,7 +113,7 @@
 </file>
 
 <file path=ppt/slideLayouts/slideLayout1.xml><?xml version="1.0" encoding="utf-8"?>
-<p:sldLayout xmlns:a="http://schemas.openxmlformats.org/drawingml/2006/main" xmlns:r="http://schemas.openxmlformats.org/officeDocument/2006/relationships" xmlns:p="http://schemas.openxmlformats.org/presentationml/2006/main" type="title" preserve="1">
+<p:sldLayout xmlns:a="http://schemas.openxmlformats.org/drawingml/2006/main" xmlns:r="http://schemas.openxmlformats.org/officeDocument/2006/relationships" xmlns:p="http://schemas.openxmlformats.org/presentationml/2006/main" preserve="1" userDrawn="1">
   <p:cSld name="Title Slide">
     <p:bg>
       <p:bgPr>
@@ -193,8 +193,8 @@
         </p:nvSpPr>
         <p:spPr>
           <a:xfrm>
-            <a:off x="1811546" y="3602038"/>
-            <a:ext cx="6646653" cy="1655762"/>
+            <a:off x="4882718" y="3602038"/>
+            <a:ext cx="3575481" cy="1655762"/>
           </a:xfrm>
         </p:spPr>
         <p:txBody>
@@ -442,6 +442,86 @@
           </a:p>
         </p:txBody>
       </p:sp>
+      <p:sp>
+        <p:nvSpPr>
+          <p:cNvPr id="5" name="Content Placeholder 2">
+            <a:extLst>
+              <a:ext uri="{FF2B5EF4-FFF2-40B4-BE49-F238E27FC236}">
+                <a16:creationId xmlns:a16="http://schemas.microsoft.com/office/drawing/2014/main" id="{02971C4F-6C96-4568-B8F9-6B5A20AB18D7}"/>
+              </a:ext>
+            </a:extLst>
+          </p:cNvPr>
+          <p:cNvSpPr>
+            <a:spLocks noGrp="1"/>
+          </p:cNvSpPr>
+          <p:nvPr>
+            <p:ph idx="10"/>
+          </p:nvPr>
+        </p:nvSpPr>
+        <p:spPr>
+          <a:xfrm>
+            <a:off x="523784" y="4521200"/>
+            <a:ext cx="4048216" cy="1655762"/>
+          </a:xfrm>
+        </p:spPr>
+        <p:txBody>
+          <a:bodyPr>
+            <a:normAutofit/>
+          </a:bodyPr>
+          <a:lstStyle>
+            <a:lvl1pPr>
+              <a:defRPr sz="1800"/>
+            </a:lvl1pPr>
+            <a:lvl2pPr>
+              <a:defRPr sz="1600"/>
+            </a:lvl2pPr>
+            <a:lvl3pPr>
+              <a:defRPr sz="1400"/>
+            </a:lvl3pPr>
+            <a:lvl4pPr>
+              <a:defRPr sz="1200"/>
+            </a:lvl4pPr>
+            <a:lvl5pPr>
+              <a:defRPr sz="1200"/>
+            </a:lvl5pPr>
+          </a:lstStyle>
+          <a:p>
+            <a:pPr lvl="0"/>
+            <a:r>
+              <a:rPr lang="en-US" dirty="0"/>
+              <a:t>Click to edit Master text styles</a:t>
+            </a:r>
+          </a:p>
+          <a:p>
+            <a:pPr lvl="1"/>
+            <a:r>
+              <a:rPr lang="en-US" dirty="0"/>
+              <a:t>Second level</a:t>
+            </a:r>
+          </a:p>
+          <a:p>
+            <a:pPr lvl="2"/>
+            <a:r>
+              <a:rPr lang="en-US" dirty="0"/>
+              <a:t>Third level</a:t>
+            </a:r>
+          </a:p>
+          <a:p>
+            <a:pPr lvl="3"/>
+            <a:r>
+              <a:rPr lang="en-US" dirty="0"/>
+              <a:t>Fourth level</a:t>
+            </a:r>
+          </a:p>
+          <a:p>
+            <a:pPr lvl="4"/>
+            <a:r>
+              <a:rPr lang="en-US" dirty="0"/>
+              <a:t>Fifth level</a:t>
+            </a:r>
+          </a:p>
+        </p:txBody>
+      </p:sp>
     </p:spTree>
     <p:extLst>
       <p:ext uri="{BB962C8B-B14F-4D97-AF65-F5344CB8AC3E}">
@@ -452,6 +532,22 @@
   <p:clrMapOvr>
     <a:masterClrMapping/>
   </p:clrMapOvr>
+  <p:extLst>
+    <p:ext uri="{DCECCB84-F9BA-43D5-87BE-67443E8EF086}">
+      <p15:sldGuideLst xmlns:p15="http://schemas.microsoft.com/office/powerpoint/2012/main">
+        <p15:guide id="1" orient="horz" pos="2160" userDrawn="1">
+          <p15:clr>
+            <a:srgbClr val="FBAE40"/>
+          </p15:clr>
+        </p15:guide>
+        <p15:guide id="2" pos="2880" userDrawn="1">
+          <p15:clr>
+            <a:srgbClr val="FBAE40"/>
+          </p15:clr>
+        </p15:guide>
+      </p15:sldGuideLst>
+    </p:ext>
+  </p:extLst>
 </p:sldLayout>
 </file>
 
@@ -732,38 +828,37 @@
           <a:p>
             <a:pPr lvl="0"/>
             <a:r>
-              <a:rPr lang="en-US"/>
+              <a:rPr lang="en-US" dirty="0"/>
               <a:t>Click to edit Master text styles</a:t>
             </a:r>
           </a:p>
           <a:p>
             <a:pPr lvl="1"/>
             <a:r>
-              <a:rPr lang="en-US"/>
+              <a:rPr lang="en-US" dirty="0"/>
               <a:t>Second level</a:t>
             </a:r>
           </a:p>
           <a:p>
             <a:pPr lvl="2"/>
             <a:r>
-              <a:rPr lang="en-US"/>
+              <a:rPr lang="en-US" dirty="0"/>
               <a:t>Third level</a:t>
             </a:r>
           </a:p>
           <a:p>
             <a:pPr lvl="3"/>
             <a:r>
-              <a:rPr lang="en-US"/>
+              <a:rPr lang="en-US" dirty="0"/>
               <a:t>Fourth level</a:t>
             </a:r>
           </a:p>
           <a:p>
             <a:pPr lvl="4"/>
             <a:r>
-              <a:rPr lang="en-US"/>
+              <a:rPr lang="en-US" dirty="0"/>
               <a:t>Fifth level</a:t>
             </a:r>
-            <a:endParaRPr lang="en-US" dirty="0"/>
           </a:p>
         </p:txBody>
       </p:sp>
@@ -1407,8 +1502,8 @@
         </p:nvSpPr>
         <p:spPr>
           <a:xfrm>
-            <a:off x="628650" y="1825625"/>
-            <a:ext cx="3886200" cy="4351338"/>
+            <a:off x="628650" y="1162975"/>
+            <a:ext cx="3886200" cy="5013988"/>
           </a:xfrm>
         </p:spPr>
         <p:txBody>
@@ -1464,8 +1559,8 @@
         </p:nvSpPr>
         <p:spPr>
           <a:xfrm>
-            <a:off x="4629150" y="1825625"/>
-            <a:ext cx="3886200" cy="4351338"/>
+            <a:off x="4629150" y="1162975"/>
+            <a:ext cx="3886200" cy="5013988"/>
           </a:xfrm>
         </p:spPr>
         <p:txBody>
@@ -3113,8 +3208,8 @@
         </p:nvSpPr>
         <p:spPr>
           <a:xfrm>
-            <a:off x="628650" y="365126"/>
-            <a:ext cx="7886700" cy="1325563"/>
+            <a:off x="628650" y="365127"/>
+            <a:ext cx="7886700" cy="717950"/>
           </a:xfrm>
           <a:prstGeom prst="rect">
             <a:avLst/>
@@ -3145,8 +3240,8 @@
         </p:nvSpPr>
         <p:spPr>
           <a:xfrm>
-            <a:off x="628650" y="1825625"/>
-            <a:ext cx="7886700" cy="4351338"/>
+            <a:off x="628650" y="1147085"/>
+            <a:ext cx="7886700" cy="5029878"/>
           </a:xfrm>
           <a:prstGeom prst="rect">
             <a:avLst/>

</xml_diff>